<commit_message>
Justified the poster, looks better
</commit_message>
<xml_diff>
--- a/Documentation/Poster/Poster.pptx
+++ b/Documentation/Poster/Poster.pptx
@@ -104,6 +104,11 @@
       </a:defRPr>
     </a:lvl9pPr>
   </p:defaultTextStyle>
+  <p:extLst>
+    <p:ext uri="{EFAFB233-063F-42B5-8137-9DF3F51BA10A}">
+      <p15:sldGuideLst xmlns:p15="http://schemas.microsoft.com/office/powerpoint/2012/main"/>
+    </p:ext>
+  </p:extLst>
 </p:presentation>
 </file>
 
@@ -238,7 +243,7 @@
           <a:p>
             <a:fld id="{3463DB28-6E68-436C-B067-02619AAB958B}" type="datetimeFigureOut">
               <a:rPr lang="en-AU" smtClean="0"/>
-              <a:t>18/06/2020</a:t>
+              <a:t>19/06/2020</a:t>
             </a:fld>
             <a:endParaRPr lang="en-AU"/>
           </a:p>
@@ -408,7 +413,7 @@
           <a:p>
             <a:fld id="{3463DB28-6E68-436C-B067-02619AAB958B}" type="datetimeFigureOut">
               <a:rPr lang="en-AU" smtClean="0"/>
-              <a:t>18/06/2020</a:t>
+              <a:t>19/06/2020</a:t>
             </a:fld>
             <a:endParaRPr lang="en-AU"/>
           </a:p>
@@ -588,7 +593,7 @@
           <a:p>
             <a:fld id="{3463DB28-6E68-436C-B067-02619AAB958B}" type="datetimeFigureOut">
               <a:rPr lang="en-AU" smtClean="0"/>
-              <a:t>18/06/2020</a:t>
+              <a:t>19/06/2020</a:t>
             </a:fld>
             <a:endParaRPr lang="en-AU"/>
           </a:p>
@@ -758,7 +763,7 @@
           <a:p>
             <a:fld id="{3463DB28-6E68-436C-B067-02619AAB958B}" type="datetimeFigureOut">
               <a:rPr lang="en-AU" smtClean="0"/>
-              <a:t>18/06/2020</a:t>
+              <a:t>19/06/2020</a:t>
             </a:fld>
             <a:endParaRPr lang="en-AU"/>
           </a:p>
@@ -1002,7 +1007,7 @@
           <a:p>
             <a:fld id="{3463DB28-6E68-436C-B067-02619AAB958B}" type="datetimeFigureOut">
               <a:rPr lang="en-AU" smtClean="0"/>
-              <a:t>18/06/2020</a:t>
+              <a:t>19/06/2020</a:t>
             </a:fld>
             <a:endParaRPr lang="en-AU"/>
           </a:p>
@@ -1234,7 +1239,7 @@
           <a:p>
             <a:fld id="{3463DB28-6E68-436C-B067-02619AAB958B}" type="datetimeFigureOut">
               <a:rPr lang="en-AU" smtClean="0"/>
-              <a:t>18/06/2020</a:t>
+              <a:t>19/06/2020</a:t>
             </a:fld>
             <a:endParaRPr lang="en-AU"/>
           </a:p>
@@ -1601,7 +1606,7 @@
           <a:p>
             <a:fld id="{3463DB28-6E68-436C-B067-02619AAB958B}" type="datetimeFigureOut">
               <a:rPr lang="en-AU" smtClean="0"/>
-              <a:t>18/06/2020</a:t>
+              <a:t>19/06/2020</a:t>
             </a:fld>
             <a:endParaRPr lang="en-AU"/>
           </a:p>
@@ -1719,7 +1724,7 @@
           <a:p>
             <a:fld id="{3463DB28-6E68-436C-B067-02619AAB958B}" type="datetimeFigureOut">
               <a:rPr lang="en-AU" smtClean="0"/>
-              <a:t>18/06/2020</a:t>
+              <a:t>19/06/2020</a:t>
             </a:fld>
             <a:endParaRPr lang="en-AU"/>
           </a:p>
@@ -1814,7 +1819,7 @@
           <a:p>
             <a:fld id="{3463DB28-6E68-436C-B067-02619AAB958B}" type="datetimeFigureOut">
               <a:rPr lang="en-AU" smtClean="0"/>
-              <a:t>18/06/2020</a:t>
+              <a:t>19/06/2020</a:t>
             </a:fld>
             <a:endParaRPr lang="en-AU"/>
           </a:p>
@@ -2091,7 +2096,7 @@
           <a:p>
             <a:fld id="{3463DB28-6E68-436C-B067-02619AAB958B}" type="datetimeFigureOut">
               <a:rPr lang="en-AU" smtClean="0"/>
-              <a:t>18/06/2020</a:t>
+              <a:t>19/06/2020</a:t>
             </a:fld>
             <a:endParaRPr lang="en-AU"/>
           </a:p>
@@ -2348,7 +2353,7 @@
           <a:p>
             <a:fld id="{3463DB28-6E68-436C-B067-02619AAB958B}" type="datetimeFigureOut">
               <a:rPr lang="en-AU" smtClean="0"/>
-              <a:t>18/06/2020</a:t>
+              <a:t>19/06/2020</a:t>
             </a:fld>
             <a:endParaRPr lang="en-AU"/>
           </a:p>
@@ -2561,7 +2566,7 @@
           <a:p>
             <a:fld id="{3463DB28-6E68-436C-B067-02619AAB958B}" type="datetimeFigureOut">
               <a:rPr lang="en-AU" smtClean="0"/>
-              <a:t>18/06/2020</a:t>
+              <a:t>19/06/2020</a:t>
             </a:fld>
             <a:endParaRPr lang="en-AU"/>
           </a:p>
@@ -2968,10 +2973,10 @@
       </p:grpSpPr>
       <p:grpSp>
         <p:nvGrpSpPr>
-          <p:cNvPr id="40" name="Group 39">
+          <p:cNvPr id="10" name="Group 9">
             <a:extLst>
               <a:ext uri="{FF2B5EF4-FFF2-40B4-BE49-F238E27FC236}">
-                <a16:creationId xmlns:a16="http://schemas.microsoft.com/office/drawing/2014/main" id="{EA66318E-8994-488C-9C29-86D050C38BDB}"/>
+                <a16:creationId xmlns:a16="http://schemas.microsoft.com/office/drawing/2014/main" id="{EE464FB4-38C9-4F11-B09E-8C4562E6FDF6}"/>
               </a:ext>
             </a:extLst>
           </p:cNvPr>
@@ -2980,200 +2985,150 @@
         </p:nvGrpSpPr>
         <p:grpSpPr>
           <a:xfrm>
-            <a:off x="13307540" y="14814422"/>
-            <a:ext cx="8919303" cy="15876301"/>
-            <a:chOff x="13307540" y="14814422"/>
-            <a:chExt cx="8919303" cy="15876301"/>
+            <a:off x="12582819" y="17976639"/>
+            <a:ext cx="11660476" cy="14719969"/>
+            <a:chOff x="13241567" y="18236730"/>
+            <a:chExt cx="11001728" cy="13888378"/>
           </a:xfrm>
         </p:grpSpPr>
-        <p:grpSp>
-          <p:nvGrpSpPr>
-            <p:cNvPr id="34" name="Group 33">
+        <p:pic>
+          <p:nvPicPr>
+            <p:cNvPr id="11" name="Picture 10">
               <a:extLst>
                 <a:ext uri="{FF2B5EF4-FFF2-40B4-BE49-F238E27FC236}">
-                  <a16:creationId xmlns:a16="http://schemas.microsoft.com/office/drawing/2014/main" id="{A0BF9332-8120-4A13-871F-D397EA64070F}"/>
+                  <a16:creationId xmlns:a16="http://schemas.microsoft.com/office/drawing/2014/main" id="{6D150FC6-A63D-475C-8CF8-5F27F167FC5F}"/>
                 </a:ext>
               </a:extLst>
             </p:cNvPr>
-            <p:cNvGrpSpPr/>
+            <p:cNvPicPr>
+              <a:picLocks noChangeAspect="1"/>
+            </p:cNvPicPr>
             <p:nvPr/>
-          </p:nvGrpSpPr>
-          <p:grpSpPr>
+          </p:nvPicPr>
+          <p:blipFill>
+            <a:blip r:embed="rId2">
+              <a:extLst>
+                <a:ext uri="{28A0092B-C50C-407E-A947-70E740481C1C}">
+                  <a14:useLocalDpi xmlns:a14="http://schemas.microsoft.com/office/drawing/2010/main" val="0"/>
+                </a:ext>
+              </a:extLst>
+            </a:blip>
+            <a:srcRect/>
+            <a:stretch/>
+          </p:blipFill>
+          <p:spPr>
             <a:xfrm>
-              <a:off x="13307540" y="14814422"/>
-              <a:ext cx="8919303" cy="15876301"/>
-              <a:chOff x="13307540" y="14814422"/>
-              <a:chExt cx="8919303" cy="15876301"/>
+              <a:off x="13241567" y="18236730"/>
+              <a:ext cx="11001728" cy="13888378"/>
             </a:xfrm>
-          </p:grpSpPr>
-          <p:pic>
-            <p:nvPicPr>
-              <p:cNvPr id="11" name="Picture 10" descr="A close up of a weapon&#10;&#10;Description automatically generated">
-                <a:extLst>
-                  <a:ext uri="{FF2B5EF4-FFF2-40B4-BE49-F238E27FC236}">
-                    <a16:creationId xmlns:a16="http://schemas.microsoft.com/office/drawing/2014/main" id="{6D150FC6-A63D-475C-8CF8-5F27F167FC5F}"/>
-                  </a:ext>
-                </a:extLst>
-              </p:cNvPr>
-              <p:cNvPicPr>
-                <a:picLocks noChangeAspect="1"/>
-              </p:cNvPicPr>
-              <p:nvPr/>
-            </p:nvPicPr>
-            <p:blipFill rotWithShape="1">
-              <a:blip r:embed="rId2">
-                <a:clrChange>
-                  <a:clrFrom>
-                    <a:srgbClr val="E8EAE7"/>
-                  </a:clrFrom>
-                  <a:clrTo>
-                    <a:srgbClr val="E8EAE7">
-                      <a:alpha val="0"/>
-                    </a:srgbClr>
-                  </a:clrTo>
-                </a:clrChange>
-                <a:extLst>
-                  <a:ext uri="{BEBA8EAE-BF5A-486C-A8C5-ECC9F3942E4B}">
-                    <a14:imgProps xmlns:a14="http://schemas.microsoft.com/office/drawing/2010/main">
-                      <a14:imgLayer r:embed="rId3">
-                        <a14:imgEffect>
-                          <a14:backgroundRemoval t="8469" b="77194" l="4415" r="89931">
-                            <a14:foregroundMark x1="9152" y1="42449" x2="6696" y2="42347"/>
-                            <a14:foregroundMark x1="6696" y1="42347" x2="5729" y2="41531"/>
-                            <a14:foregroundMark x1="5283" y1="48061" x2="8433" y2="47959"/>
-                            <a14:foregroundMark x1="8433" y1="47959" x2="8433" y2="47959"/>
-                            <a14:foregroundMark x1="9201" y1="48929" x2="5952" y2="49796"/>
-                            <a14:foregroundMark x1="5952" y1="49796" x2="5952" y2="49796"/>
-                            <a14:foregroundMark x1="4415" y1="48980" x2="4415" y2="48980"/>
-                            <a14:foregroundMark x1="5828" y1="41276" x2="5828" y2="41276"/>
-                            <a14:foregroundMark x1="4985" y1="42653" x2="4985" y2="42653"/>
-                          </a14:backgroundRemoval>
-                        </a14:imgEffect>
-                      </a14:imgLayer>
-                    </a14:imgProps>
-                  </a:ext>
-                  <a:ext uri="{28A0092B-C50C-407E-A947-70E740481C1C}">
-                    <a14:useLocalDpi xmlns:a14="http://schemas.microsoft.com/office/drawing/2010/main" val="0"/>
-                  </a:ext>
-                </a:extLst>
-              </a:blip>
-              <a:srcRect r="25755" b="14194"/>
-              <a:stretch/>
-            </p:blipFill>
-            <p:spPr>
-              <a:xfrm rot="4049423">
-                <a:off x="9829041" y="18292921"/>
-                <a:ext cx="15876301" cy="8919303"/>
-              </a:xfrm>
-              <a:prstGeom prst="rect">
-                <a:avLst/>
-              </a:prstGeom>
-            </p:spPr>
-          </p:pic>
-          <p:sp>
-            <p:nvSpPr>
-              <p:cNvPr id="29" name="TextBox 28">
-                <a:extLst>
-                  <a:ext uri="{FF2B5EF4-FFF2-40B4-BE49-F238E27FC236}">
-                    <a16:creationId xmlns:a16="http://schemas.microsoft.com/office/drawing/2014/main" id="{AF4FE5CC-6E67-4DC3-96CD-05F6D940550F}"/>
-                  </a:ext>
-                </a:extLst>
-              </p:cNvPr>
-              <p:cNvSpPr txBox="1"/>
-              <p:nvPr/>
-            </p:nvSpPr>
-            <p:spPr>
-              <a:xfrm>
-                <a:off x="14042488" y="26589225"/>
-                <a:ext cx="3444912" cy="2062103"/>
-              </a:xfrm>
-              <a:prstGeom prst="rect">
-                <a:avLst/>
-              </a:prstGeom>
+            <a:prstGeom prst="rect">
+              <a:avLst/>
+            </a:prstGeom>
+          </p:spPr>
+        </p:pic>
+        <p:sp>
+          <p:nvSpPr>
+            <p:cNvPr id="59" name="TextBox 58">
+              <a:extLst>
+                <a:ext uri="{FF2B5EF4-FFF2-40B4-BE49-F238E27FC236}">
+                  <a16:creationId xmlns:a16="http://schemas.microsoft.com/office/drawing/2014/main" id="{E311E371-578E-48D4-A817-8BA9E82A1A15}"/>
+                </a:ext>
+              </a:extLst>
+            </p:cNvPr>
+            <p:cNvSpPr txBox="1"/>
+            <p:nvPr/>
+          </p:nvSpPr>
+          <p:spPr>
+            <a:xfrm>
+              <a:off x="14734523" y="25534508"/>
+              <a:ext cx="3182162" cy="2062103"/>
+            </a:xfrm>
+            <a:prstGeom prst="rect">
+              <a:avLst/>
+            </a:prstGeom>
+            <a:noFill/>
+            <a:ln>
               <a:noFill/>
-              <a:ln>
-                <a:noFill/>
-              </a:ln>
-            </p:spPr>
-            <p:txBody>
-              <a:bodyPr wrap="square" rtlCol="0">
-                <a:spAutoFit/>
-              </a:bodyPr>
-              <a:lstStyle/>
-              <a:p>
-                <a:pPr algn="ctr"/>
-                <a:r>
-                  <a:rPr lang="en-US" sz="3200" dirty="0">
-                    <a:solidFill>
-                      <a:srgbClr val="20B1E8"/>
-                    </a:solidFill>
-                    <a:latin typeface="Arial Black" panose="020B0A04020102020204" pitchFamily="34" charset="0"/>
-                  </a:rPr>
-                  <a:t>The 3D Printed Prosthetic Arm</a:t>
-                </a:r>
-                <a:endParaRPr lang="en-AU" sz="3200" dirty="0">
+            </a:ln>
+          </p:spPr>
+          <p:txBody>
+            <a:bodyPr wrap="square" rtlCol="0">
+              <a:spAutoFit/>
+            </a:bodyPr>
+            <a:lstStyle/>
+            <a:p>
+              <a:pPr algn="ctr"/>
+              <a:r>
+                <a:rPr lang="en-US" sz="3200" dirty="0">
                   <a:solidFill>
                     <a:srgbClr val="20B1E8"/>
                   </a:solidFill>
                   <a:latin typeface="Arial Black" panose="020B0A04020102020204" pitchFamily="34" charset="0"/>
-                </a:endParaRPr>
-              </a:p>
-            </p:txBody>
-          </p:sp>
-        </p:grpSp>
-        <p:sp>
-          <p:nvSpPr>
-            <p:cNvPr id="39" name="Rectangle 38">
-              <a:extLst>
-                <a:ext uri="{FF2B5EF4-FFF2-40B4-BE49-F238E27FC236}">
-                  <a16:creationId xmlns:a16="http://schemas.microsoft.com/office/drawing/2014/main" id="{BEB79818-46FB-441B-9D3F-BA7F13040B79}"/>
-                </a:ext>
-              </a:extLst>
-            </p:cNvPr>
-            <p:cNvSpPr/>
-            <p:nvPr/>
-          </p:nvSpPr>
-          <p:spPr>
-            <a:xfrm>
-              <a:off x="17843500" y="28187650"/>
-              <a:ext cx="95250" cy="114300"/>
-            </a:xfrm>
-            <a:prstGeom prst="rect">
-              <a:avLst/>
-            </a:prstGeom>
-            <a:solidFill>
-              <a:srgbClr val="5F6D66"/>
-            </a:solidFill>
-            <a:ln>
-              <a:noFill/>
-            </a:ln>
-          </p:spPr>
-          <p:style>
-            <a:lnRef idx="2">
-              <a:schemeClr val="accent1">
-                <a:shade val="50000"/>
-              </a:schemeClr>
-            </a:lnRef>
-            <a:fillRef idx="1">
-              <a:schemeClr val="accent1"/>
-            </a:fillRef>
-            <a:effectRef idx="0">
-              <a:schemeClr val="accent1"/>
-            </a:effectRef>
-            <a:fontRef idx="minor">
-              <a:schemeClr val="lt1"/>
-            </a:fontRef>
-          </p:style>
-          <p:txBody>
-            <a:bodyPr rtlCol="0" anchor="ctr"/>
-            <a:lstStyle/>
-            <a:p>
-              <a:pPr algn="ctr"/>
-              <a:endParaRPr lang="en-AU"/>
+                </a:rPr>
+                <a:t>The 3D Printed Prosthetic Hand</a:t>
+              </a:r>
+              <a:endParaRPr lang="en-AU" sz="3200" dirty="0">
+                <a:solidFill>
+                  <a:srgbClr val="20B1E8"/>
+                </a:solidFill>
+                <a:latin typeface="Arial Black" panose="020B0A04020102020204" pitchFamily="34" charset="0"/>
+              </a:endParaRPr>
             </a:p>
           </p:txBody>
         </p:sp>
       </p:grpSp>
+      <p:sp>
+        <p:nvSpPr>
+          <p:cNvPr id="39" name="Rectangle 38">
+            <a:extLst>
+              <a:ext uri="{FF2B5EF4-FFF2-40B4-BE49-F238E27FC236}">
+                <a16:creationId xmlns:a16="http://schemas.microsoft.com/office/drawing/2014/main" id="{BEB79818-46FB-441B-9D3F-BA7F13040B79}"/>
+              </a:ext>
+            </a:extLst>
+          </p:cNvPr>
+          <p:cNvSpPr/>
+          <p:nvPr/>
+        </p:nvSpPr>
+        <p:spPr>
+          <a:xfrm>
+            <a:off x="19139772" y="29762224"/>
+            <a:ext cx="76925" cy="92310"/>
+          </a:xfrm>
+          <a:prstGeom prst="rect">
+            <a:avLst/>
+          </a:prstGeom>
+          <a:solidFill>
+            <a:srgbClr val="5F6D66"/>
+          </a:solidFill>
+          <a:ln>
+            <a:noFill/>
+          </a:ln>
+        </p:spPr>
+        <p:style>
+          <a:lnRef idx="2">
+            <a:schemeClr val="accent1">
+              <a:shade val="50000"/>
+            </a:schemeClr>
+          </a:lnRef>
+          <a:fillRef idx="1">
+            <a:schemeClr val="accent1"/>
+          </a:fillRef>
+          <a:effectRef idx="0">
+            <a:schemeClr val="accent1"/>
+          </a:effectRef>
+          <a:fontRef idx="minor">
+            <a:schemeClr val="lt1"/>
+          </a:fontRef>
+        </p:style>
+        <p:txBody>
+          <a:bodyPr rtlCol="0" anchor="ctr"/>
+          <a:lstStyle/>
+          <a:p>
+            <a:pPr algn="ctr"/>
+            <a:endParaRPr lang="en-AU"/>
+          </a:p>
+        </p:txBody>
+      </p:sp>
       <p:pic>
         <p:nvPicPr>
           <p:cNvPr id="5" name="Picture 4">
@@ -3189,7 +3144,7 @@
           <p:nvPr/>
         </p:nvPicPr>
         <p:blipFill>
-          <a:blip r:embed="rId4">
+          <a:blip r:embed="rId3">
             <a:extLst>
               <a:ext uri="{28A0092B-C50C-407E-A947-70E740481C1C}">
                 <a14:useLocalDpi xmlns:a14="http://schemas.microsoft.com/office/drawing/2010/main" val="0"/>
@@ -3225,7 +3180,7 @@
           <p:nvPr/>
         </p:nvPicPr>
         <p:blipFill>
-          <a:blip r:embed="rId5">
+          <a:blip r:embed="rId4">
             <a:extLst>
               <a:ext uri="{28A0092B-C50C-407E-A947-70E740481C1C}">
                 <a14:useLocalDpi xmlns:a14="http://schemas.microsoft.com/office/drawing/2010/main" val="0"/>
@@ -3393,7 +3348,7 @@
         <p:spPr>
           <a:xfrm>
             <a:off x="419100" y="3471138"/>
-            <a:ext cx="9220200" cy="4031873"/>
+            <a:ext cx="11734800" cy="3046988"/>
           </a:xfrm>
           <a:prstGeom prst="rect">
             <a:avLst/>
@@ -3448,8 +3403,8 @@
         </p:nvSpPr>
         <p:spPr>
           <a:xfrm>
-            <a:off x="419100" y="7687962"/>
-            <a:ext cx="9220200" cy="2554545"/>
+            <a:off x="419099" y="6506862"/>
+            <a:ext cx="11269610" cy="2062103"/>
           </a:xfrm>
           <a:prstGeom prst="rect">
             <a:avLst/>
@@ -3497,7 +3452,7 @@
         </p:nvGrpSpPr>
         <p:grpSpPr>
           <a:xfrm>
-            <a:off x="419100" y="15240468"/>
+            <a:off x="12582819" y="3452460"/>
             <a:ext cx="8421329" cy="4739758"/>
             <a:chOff x="11744325" y="6382752"/>
             <a:chExt cx="9220200" cy="4739758"/>
@@ -3531,6 +3486,7 @@
             </a:bodyPr>
             <a:lstStyle/>
             <a:p>
+              <a:pPr algn="r"/>
               <a:r>
                 <a:rPr lang="en-US" sz="4000" dirty="0">
                   <a:latin typeface="Arial Black" panose="020B0A04020102020204" pitchFamily="34" charset="0"/>
@@ -3571,6 +3527,7 @@
             </a:bodyPr>
             <a:lstStyle/>
             <a:p>
+              <a:pPr algn="r"/>
               <a:r>
                 <a:rPr lang="en-US" sz="3200" dirty="0">
                   <a:latin typeface="Arial" panose="020B0604020202020204" pitchFamily="34" charset="0"/>
@@ -3614,7 +3571,7 @@
         </p:nvGrpSpPr>
         <p:grpSpPr>
           <a:xfrm>
-            <a:off x="2094614" y="10427459"/>
+            <a:off x="2094614" y="8446259"/>
             <a:ext cx="17027306" cy="4786526"/>
             <a:chOff x="2094614" y="10427459"/>
             <a:chExt cx="17027306" cy="4786526"/>
@@ -3635,7 +3592,7 @@
             <p:nvPr/>
           </p:nvPicPr>
           <p:blipFill>
-            <a:blip r:embed="rId6">
+            <a:blip r:embed="rId5">
               <a:extLst>
                 <a:ext uri="{28A0092B-C50C-407E-A947-70E740481C1C}">
                   <a14:useLocalDpi xmlns:a14="http://schemas.microsoft.com/office/drawing/2010/main" val="0"/>
@@ -3720,8 +3677,8 @@
         </p:nvGrpSpPr>
         <p:grpSpPr>
           <a:xfrm>
-            <a:off x="190500" y="22353764"/>
-            <a:ext cx="6362700" cy="6585779"/>
+            <a:off x="7772400" y="20468128"/>
+            <a:ext cx="7415973" cy="7675980"/>
             <a:chOff x="2086815" y="15693923"/>
             <a:chExt cx="6362700" cy="6585779"/>
           </a:xfrm>
@@ -3741,7 +3698,7 @@
             <p:nvPr/>
           </p:nvPicPr>
           <p:blipFill>
-            <a:blip r:embed="rId7">
+            <a:blip r:embed="rId6">
               <a:extLst>
                 <a:ext uri="{28A0092B-C50C-407E-A947-70E740481C1C}">
                   <a14:useLocalDpi xmlns:a14="http://schemas.microsoft.com/office/drawing/2010/main" val="0"/>
@@ -3839,10 +3796,10 @@
         </p:nvGrpSpPr>
         <p:grpSpPr>
           <a:xfrm>
-            <a:off x="11744326" y="3909547"/>
-            <a:ext cx="9220199" cy="5970864"/>
+            <a:off x="419102" y="13999382"/>
+            <a:ext cx="10003662" cy="5601532"/>
             <a:chOff x="10869672" y="6382752"/>
-            <a:chExt cx="10094853" cy="5970864"/>
+            <a:chExt cx="10094853" cy="5601532"/>
           </a:xfrm>
         </p:grpSpPr>
         <p:sp>
@@ -3859,7 +3816,7 @@
           </p:nvSpPr>
           <p:spPr>
             <a:xfrm>
-              <a:off x="11744325" y="6382752"/>
+              <a:off x="10874860" y="6382752"/>
               <a:ext cx="9220200" cy="707886"/>
             </a:xfrm>
             <a:prstGeom prst="rect">
@@ -3873,7 +3830,6 @@
             </a:bodyPr>
             <a:lstStyle/>
             <a:p>
-              <a:pPr algn="r"/>
               <a:r>
                 <a:rPr lang="en-US" sz="4000" dirty="0">
                   <a:latin typeface="Arial Black" panose="020B0A04020102020204" pitchFamily="34" charset="0"/>
@@ -3901,7 +3857,7 @@
           <p:spPr>
             <a:xfrm>
               <a:off x="10869672" y="7090637"/>
-              <a:ext cx="10094853" cy="5262979"/>
+              <a:ext cx="10094853" cy="4893647"/>
             </a:xfrm>
             <a:prstGeom prst="rect">
               <a:avLst/>
@@ -3914,7 +3870,6 @@
             </a:bodyPr>
             <a:lstStyle/>
             <a:p>
-              <a:pPr algn="r"/>
               <a:r>
                 <a:rPr lang="en-US" sz="3200" dirty="0">
                   <a:latin typeface="Arial" panose="020B0604020202020204" pitchFamily="34" charset="0"/>
@@ -3938,6 +3893,9 @@
               </a:r>
               <a:r>
                 <a:rPr lang="en-US" sz="4000" b="1" dirty="0">
+                  <a:solidFill>
+                    <a:srgbClr val="20B1E8"/>
+                  </a:solidFill>
                   <a:latin typeface="Arial" panose="020B0604020202020204" pitchFamily="34" charset="0"/>
                   <a:cs typeface="Arial" panose="020B0604020202020204" pitchFamily="34" charset="0"/>
                 </a:rPr>
@@ -3979,10 +3937,10 @@
         </p:nvGrpSpPr>
         <p:grpSpPr>
           <a:xfrm>
-            <a:off x="6291833" y="20747984"/>
-            <a:ext cx="8421329" cy="6217085"/>
-            <a:chOff x="11744325" y="6382752"/>
-            <a:chExt cx="9220200" cy="6217085"/>
+            <a:off x="495132" y="20875650"/>
+            <a:ext cx="7912781" cy="6749765"/>
+            <a:chOff x="11744325" y="6448188"/>
+            <a:chExt cx="9220200" cy="5796350"/>
           </a:xfrm>
         </p:grpSpPr>
         <p:sp>
@@ -3999,7 +3957,7 @@
           </p:nvSpPr>
           <p:spPr>
             <a:xfrm>
-              <a:off x="11744325" y="6382752"/>
+              <a:off x="11744325" y="6448188"/>
               <a:ext cx="9220200" cy="707886"/>
             </a:xfrm>
             <a:prstGeom prst="rect">
@@ -4013,7 +3971,6 @@
             </a:bodyPr>
             <a:lstStyle/>
             <a:p>
-              <a:pPr algn="ctr"/>
               <a:r>
                 <a:rPr lang="en-US" sz="4000" dirty="0">
                   <a:latin typeface="Arial Black" panose="020B0A04020102020204" pitchFamily="34" charset="0"/>
@@ -4041,7 +3998,7 @@
           <p:spPr>
             <a:xfrm>
               <a:off x="11744325" y="7090637"/>
-              <a:ext cx="9220200" cy="5509200"/>
+              <a:ext cx="9220200" cy="5153901"/>
             </a:xfrm>
             <a:prstGeom prst="rect">
               <a:avLst/>
@@ -4054,7 +4011,6 @@
             </a:bodyPr>
             <a:lstStyle/>
             <a:p>
-              <a:pPr algn="ctr"/>
               <a:r>
                 <a:rPr lang="en-US" sz="3200" dirty="0">
                   <a:latin typeface="Arial" panose="020B0604020202020204" pitchFamily="34" charset="0"/>
@@ -4074,29 +4030,651 @@
                   <a:latin typeface="Arial" panose="020B0604020202020204" pitchFamily="34" charset="0"/>
                   <a:cs typeface="Arial" panose="020B0604020202020204" pitchFamily="34" charset="0"/>
                 </a:rPr>
-                <a:t>) machine learning algorithm. The SVM model is created using a training dataset and Matlab, then uploaded to the board. When the SVM has predicted</a:t>
+                <a:t>) machine learning algorithm. The SVM model is created using a training dataset and Matlab, then uploaded to the board. When the SVM has predicted the state of the hand, 5 PWM control signals are generated to control each finger.</a:t>
               </a:r>
+              <a:endParaRPr lang="en-AU" sz="3200" dirty="0">
+                <a:latin typeface="Arial" panose="020B0604020202020204" pitchFamily="34" charset="0"/>
+                <a:cs typeface="Arial" panose="020B0604020202020204" pitchFamily="34" charset="0"/>
+              </a:endParaRPr>
             </a:p>
+          </p:txBody>
+        </p:sp>
+      </p:grpSp>
+      <p:grpSp>
+        <p:nvGrpSpPr>
+          <p:cNvPr id="6" name="Group 5">
+            <a:extLst>
+              <a:ext uri="{FF2B5EF4-FFF2-40B4-BE49-F238E27FC236}">
+                <a16:creationId xmlns:a16="http://schemas.microsoft.com/office/drawing/2014/main" id="{B3F78544-5745-445A-8E0B-373B0153230A}"/>
+              </a:ext>
+            </a:extLst>
+          </p:cNvPr>
+          <p:cNvGrpSpPr/>
+          <p:nvPr/>
+        </p:nvGrpSpPr>
+        <p:grpSpPr>
+          <a:xfrm>
+            <a:off x="11688709" y="13339075"/>
+            <a:ext cx="9402698" cy="6982023"/>
+            <a:chOff x="11601450" y="13203881"/>
+            <a:chExt cx="9402698" cy="6982023"/>
+          </a:xfrm>
+        </p:grpSpPr>
+        <p:pic>
+          <p:nvPicPr>
+            <p:cNvPr id="3" name="Picture 2" descr="A screenshot of a cell phone&#10;&#10;Description automatically generated">
+              <a:extLst>
+                <a:ext uri="{FF2B5EF4-FFF2-40B4-BE49-F238E27FC236}">
+                  <a16:creationId xmlns:a16="http://schemas.microsoft.com/office/drawing/2014/main" id="{D00C78D8-C2D9-4EB7-AC96-159E48789AE8}"/>
+                </a:ext>
+              </a:extLst>
+            </p:cNvPr>
+            <p:cNvPicPr>
+              <a:picLocks noChangeAspect="1"/>
+            </p:cNvPicPr>
+            <p:nvPr/>
+          </p:nvPicPr>
+          <p:blipFill rotWithShape="1">
+            <a:blip r:embed="rId7">
+              <a:extLst>
+                <a:ext uri="{28A0092B-C50C-407E-A947-70E740481C1C}">
+                  <a14:useLocalDpi xmlns:a14="http://schemas.microsoft.com/office/drawing/2010/main" val="0"/>
+                </a:ext>
+              </a:extLst>
+            </a:blip>
+            <a:srcRect l="12707" t="7190" r="9232" b="10676"/>
+            <a:stretch/>
+          </p:blipFill>
+          <p:spPr>
+            <a:xfrm>
+              <a:off x="12901994" y="14212334"/>
+              <a:ext cx="6774624" cy="5270708"/>
+            </a:xfrm>
+            <a:prstGeom prst="rect">
+              <a:avLst/>
+            </a:prstGeom>
+          </p:spPr>
+        </p:pic>
+        <p:sp>
+          <p:nvSpPr>
+            <p:cNvPr id="31" name="TextBox 30">
+              <a:extLst>
+                <a:ext uri="{FF2B5EF4-FFF2-40B4-BE49-F238E27FC236}">
+                  <a16:creationId xmlns:a16="http://schemas.microsoft.com/office/drawing/2014/main" id="{B9FA2076-F49F-4302-8E9B-FC99E51EC9B5}"/>
+                </a:ext>
+              </a:extLst>
+            </p:cNvPr>
+            <p:cNvSpPr txBox="1"/>
+            <p:nvPr/>
+          </p:nvSpPr>
+          <p:spPr>
+            <a:xfrm>
+              <a:off x="13873162" y="19601129"/>
+              <a:ext cx="1450175" cy="584775"/>
+            </a:xfrm>
+            <a:prstGeom prst="rect">
+              <a:avLst/>
+            </a:prstGeom>
+            <a:noFill/>
+          </p:spPr>
+          <p:txBody>
+            <a:bodyPr wrap="square" rtlCol="0">
+              <a:spAutoFit/>
+            </a:bodyPr>
+            <a:lstStyle/>
             <a:p>
               <a:pPr algn="ctr"/>
               <a:r>
                 <a:rPr lang="en-US" sz="3200" dirty="0">
-                  <a:latin typeface="Arial" panose="020B0604020202020204" pitchFamily="34" charset="0"/>
-                  <a:cs typeface="Arial" panose="020B0604020202020204" pitchFamily="34" charset="0"/>
+                  <a:latin typeface="Arial Black" panose="020B0A04020102020204" pitchFamily="34" charset="0"/>
                 </a:rPr>
-                <a:t>the state of the hand, 5 PWM control </a:t>
+                <a:t>STFT</a:t>
               </a:r>
+              <a:endParaRPr lang="en-AU" sz="3200" dirty="0">
+                <a:latin typeface="Arial Black" panose="020B0A04020102020204" pitchFamily="34" charset="0"/>
+              </a:endParaRPr>
             </a:p>
+          </p:txBody>
+        </p:sp>
+        <p:sp>
+          <p:nvSpPr>
+            <p:cNvPr id="44" name="TextBox 43">
+              <a:extLst>
+                <a:ext uri="{FF2B5EF4-FFF2-40B4-BE49-F238E27FC236}">
+                  <a16:creationId xmlns:a16="http://schemas.microsoft.com/office/drawing/2014/main" id="{591E0FB9-8932-4D4C-81B4-E019706F7F95}"/>
+                </a:ext>
+              </a:extLst>
+            </p:cNvPr>
+            <p:cNvSpPr txBox="1"/>
+            <p:nvPr/>
+          </p:nvSpPr>
+          <p:spPr>
+            <a:xfrm>
+              <a:off x="17258649" y="19601129"/>
+              <a:ext cx="1450175" cy="584775"/>
+            </a:xfrm>
+            <a:prstGeom prst="rect">
+              <a:avLst/>
+            </a:prstGeom>
+            <a:noFill/>
+          </p:spPr>
+          <p:txBody>
+            <a:bodyPr wrap="square" rtlCol="0">
+              <a:spAutoFit/>
+            </a:bodyPr>
+            <a:lstStyle/>
             <a:p>
               <a:pPr algn="ctr"/>
               <a:r>
                 <a:rPr lang="en-US" sz="3200" dirty="0">
+                  <a:latin typeface="Arial Black" panose="020B0A04020102020204" pitchFamily="34" charset="0"/>
+                </a:rPr>
+                <a:t>DCT</a:t>
+              </a:r>
+              <a:endParaRPr lang="en-AU" sz="3200" dirty="0">
+                <a:latin typeface="Arial Black" panose="020B0A04020102020204" pitchFamily="34" charset="0"/>
+              </a:endParaRPr>
+            </a:p>
+          </p:txBody>
+        </p:sp>
+        <p:sp>
+          <p:nvSpPr>
+            <p:cNvPr id="45" name="TextBox 44">
+              <a:extLst>
+                <a:ext uri="{FF2B5EF4-FFF2-40B4-BE49-F238E27FC236}">
+                  <a16:creationId xmlns:a16="http://schemas.microsoft.com/office/drawing/2014/main" id="{60D07B9F-D352-4B80-9A81-5C0E01E55C75}"/>
+                </a:ext>
+              </a:extLst>
+            </p:cNvPr>
+            <p:cNvSpPr txBox="1"/>
+            <p:nvPr/>
+          </p:nvSpPr>
+          <p:spPr>
+            <a:xfrm>
+              <a:off x="12649680" y="13203881"/>
+              <a:ext cx="7026938" cy="1077218"/>
+            </a:xfrm>
+            <a:prstGeom prst="rect">
+              <a:avLst/>
+            </a:prstGeom>
+            <a:noFill/>
+          </p:spPr>
+          <p:txBody>
+            <a:bodyPr wrap="square" rtlCol="0">
+              <a:spAutoFit/>
+            </a:bodyPr>
+            <a:lstStyle/>
+            <a:p>
+              <a:pPr algn="ctr"/>
+              <a:r>
+                <a:rPr lang="en-US" sz="3200" dirty="0">
+                  <a:latin typeface="Arial Black" panose="020B0A04020102020204" pitchFamily="34" charset="0"/>
+                </a:rPr>
+                <a:t>Classification </a:t>
+              </a:r>
+              <a:r>
+                <a:rPr lang="en-US" sz="3200" dirty="0">
+                  <a:solidFill>
+                    <a:srgbClr val="0072BD"/>
+                  </a:solidFill>
+                  <a:latin typeface="Arial Black" panose="020B0A04020102020204" pitchFamily="34" charset="0"/>
+                </a:rPr>
+                <a:t>Accuracy</a:t>
+              </a:r>
+              <a:r>
+                <a:rPr lang="en-US" sz="3200" dirty="0">
+                  <a:latin typeface="Arial Black" panose="020B0A04020102020204" pitchFamily="34" charset="0"/>
+                </a:rPr>
+                <a:t> &amp; </a:t>
+              </a:r>
+              <a:r>
+                <a:rPr lang="en-US" sz="3200" dirty="0">
+                  <a:solidFill>
+                    <a:srgbClr val="D95319"/>
+                  </a:solidFill>
+                  <a:latin typeface="Arial Black" panose="020B0A04020102020204" pitchFamily="34" charset="0"/>
+                </a:rPr>
+                <a:t>Time </a:t>
+              </a:r>
+              <a:r>
+                <a:rPr lang="en-US" sz="3200" dirty="0">
+                  <a:latin typeface="Arial Black" panose="020B0A04020102020204" pitchFamily="34" charset="0"/>
+                </a:rPr>
+                <a:t>vs FE Method</a:t>
+              </a:r>
+              <a:endParaRPr lang="en-AU" sz="3200" dirty="0">
+                <a:solidFill>
+                  <a:srgbClr val="D95319"/>
+                </a:solidFill>
+                <a:latin typeface="Arial Black" panose="020B0A04020102020204" pitchFamily="34" charset="0"/>
+              </a:endParaRPr>
+            </a:p>
+          </p:txBody>
+        </p:sp>
+        <p:sp>
+          <p:nvSpPr>
+            <p:cNvPr id="4" name="TextBox 3">
+              <a:extLst>
+                <a:ext uri="{FF2B5EF4-FFF2-40B4-BE49-F238E27FC236}">
+                  <a16:creationId xmlns:a16="http://schemas.microsoft.com/office/drawing/2014/main" id="{09816604-11AA-413D-AB45-EBEA628F2A73}"/>
+                </a:ext>
+              </a:extLst>
+            </p:cNvPr>
+            <p:cNvSpPr txBox="1"/>
+            <p:nvPr/>
+          </p:nvSpPr>
+          <p:spPr>
+            <a:xfrm>
+              <a:off x="11601450" y="13997270"/>
+              <a:ext cx="1300544" cy="523220"/>
+            </a:xfrm>
+            <a:prstGeom prst="rect">
+              <a:avLst/>
+            </a:prstGeom>
+            <a:noFill/>
+          </p:spPr>
+          <p:txBody>
+            <a:bodyPr wrap="square" rtlCol="0">
+              <a:spAutoFit/>
+            </a:bodyPr>
+            <a:lstStyle/>
+            <a:p>
+              <a:pPr algn="r"/>
+              <a:r>
+                <a:rPr lang="en-US" sz="2800" dirty="0">
                   <a:latin typeface="Arial" panose="020B0604020202020204" pitchFamily="34" charset="0"/>
                   <a:cs typeface="Arial" panose="020B0604020202020204" pitchFamily="34" charset="0"/>
                 </a:rPr>
-                <a:t>signals are generated to control each finger.</a:t>
+                <a:t>80%</a:t>
               </a:r>
-              <a:endParaRPr lang="en-AU" sz="3200" dirty="0">
+              <a:endParaRPr lang="en-AU" sz="2800" dirty="0">
+                <a:latin typeface="Arial" panose="020B0604020202020204" pitchFamily="34" charset="0"/>
+                <a:cs typeface="Arial" panose="020B0604020202020204" pitchFamily="34" charset="0"/>
+              </a:endParaRPr>
+            </a:p>
+          </p:txBody>
+        </p:sp>
+        <p:sp>
+          <p:nvSpPr>
+            <p:cNvPr id="47" name="TextBox 46">
+              <a:extLst>
+                <a:ext uri="{FF2B5EF4-FFF2-40B4-BE49-F238E27FC236}">
+                  <a16:creationId xmlns:a16="http://schemas.microsoft.com/office/drawing/2014/main" id="{C1BC903B-6F2F-4F22-913F-67BC24E32331}"/>
+                </a:ext>
+              </a:extLst>
+            </p:cNvPr>
+            <p:cNvSpPr txBox="1"/>
+            <p:nvPr/>
+          </p:nvSpPr>
+          <p:spPr>
+            <a:xfrm>
+              <a:off x="11601450" y="15286647"/>
+              <a:ext cx="1300544" cy="523220"/>
+            </a:xfrm>
+            <a:prstGeom prst="rect">
+              <a:avLst/>
+            </a:prstGeom>
+            <a:noFill/>
+          </p:spPr>
+          <p:txBody>
+            <a:bodyPr wrap="square" rtlCol="0">
+              <a:spAutoFit/>
+            </a:bodyPr>
+            <a:lstStyle/>
+            <a:p>
+              <a:pPr algn="r"/>
+              <a:r>
+                <a:rPr lang="en-US" sz="2800" dirty="0">
+                  <a:latin typeface="Arial" panose="020B0604020202020204" pitchFamily="34" charset="0"/>
+                  <a:cs typeface="Arial" panose="020B0604020202020204" pitchFamily="34" charset="0"/>
+                </a:rPr>
+                <a:t>60%</a:t>
+              </a:r>
+              <a:endParaRPr lang="en-AU" sz="2800" dirty="0">
+                <a:latin typeface="Arial" panose="020B0604020202020204" pitchFamily="34" charset="0"/>
+                <a:cs typeface="Arial" panose="020B0604020202020204" pitchFamily="34" charset="0"/>
+              </a:endParaRPr>
+            </a:p>
+          </p:txBody>
+        </p:sp>
+        <p:sp>
+          <p:nvSpPr>
+            <p:cNvPr id="49" name="TextBox 48">
+              <a:extLst>
+                <a:ext uri="{FF2B5EF4-FFF2-40B4-BE49-F238E27FC236}">
+                  <a16:creationId xmlns:a16="http://schemas.microsoft.com/office/drawing/2014/main" id="{E2C71CF7-ECE2-487B-9C6A-3ED2F1B1331E}"/>
+                </a:ext>
+              </a:extLst>
+            </p:cNvPr>
+            <p:cNvSpPr txBox="1"/>
+            <p:nvPr/>
+          </p:nvSpPr>
+          <p:spPr>
+            <a:xfrm>
+              <a:off x="11601450" y="16584646"/>
+              <a:ext cx="1300544" cy="523220"/>
+            </a:xfrm>
+            <a:prstGeom prst="rect">
+              <a:avLst/>
+            </a:prstGeom>
+            <a:noFill/>
+          </p:spPr>
+          <p:txBody>
+            <a:bodyPr wrap="square" rtlCol="0">
+              <a:spAutoFit/>
+            </a:bodyPr>
+            <a:lstStyle/>
+            <a:p>
+              <a:pPr algn="r"/>
+              <a:r>
+                <a:rPr lang="en-US" sz="2800" dirty="0">
+                  <a:latin typeface="Arial" panose="020B0604020202020204" pitchFamily="34" charset="0"/>
+                  <a:cs typeface="Arial" panose="020B0604020202020204" pitchFamily="34" charset="0"/>
+                </a:rPr>
+                <a:t>40%</a:t>
+              </a:r>
+              <a:endParaRPr lang="en-AU" sz="2800" dirty="0">
+                <a:latin typeface="Arial" panose="020B0604020202020204" pitchFamily="34" charset="0"/>
+                <a:cs typeface="Arial" panose="020B0604020202020204" pitchFamily="34" charset="0"/>
+              </a:endParaRPr>
+            </a:p>
+          </p:txBody>
+        </p:sp>
+        <p:sp>
+          <p:nvSpPr>
+            <p:cNvPr id="51" name="TextBox 50">
+              <a:extLst>
+                <a:ext uri="{FF2B5EF4-FFF2-40B4-BE49-F238E27FC236}">
+                  <a16:creationId xmlns:a16="http://schemas.microsoft.com/office/drawing/2014/main" id="{5C5734A1-968C-4386-8A5F-832883C9083A}"/>
+                </a:ext>
+              </a:extLst>
+            </p:cNvPr>
+            <p:cNvSpPr txBox="1"/>
+            <p:nvPr/>
+          </p:nvSpPr>
+          <p:spPr>
+            <a:xfrm>
+              <a:off x="11601450" y="17916126"/>
+              <a:ext cx="1300544" cy="523220"/>
+            </a:xfrm>
+            <a:prstGeom prst="rect">
+              <a:avLst/>
+            </a:prstGeom>
+            <a:noFill/>
+          </p:spPr>
+          <p:txBody>
+            <a:bodyPr wrap="square" rtlCol="0">
+              <a:spAutoFit/>
+            </a:bodyPr>
+            <a:lstStyle/>
+            <a:p>
+              <a:pPr algn="r"/>
+              <a:r>
+                <a:rPr lang="en-US" sz="2800" dirty="0">
+                  <a:latin typeface="Arial" panose="020B0604020202020204" pitchFamily="34" charset="0"/>
+                  <a:cs typeface="Arial" panose="020B0604020202020204" pitchFamily="34" charset="0"/>
+                </a:rPr>
+                <a:t>20%</a:t>
+              </a:r>
+              <a:endParaRPr lang="en-AU" sz="2800" dirty="0">
+                <a:latin typeface="Arial" panose="020B0604020202020204" pitchFamily="34" charset="0"/>
+                <a:cs typeface="Arial" panose="020B0604020202020204" pitchFamily="34" charset="0"/>
+              </a:endParaRPr>
+            </a:p>
+          </p:txBody>
+        </p:sp>
+        <p:sp>
+          <p:nvSpPr>
+            <p:cNvPr id="53" name="TextBox 52">
+              <a:extLst>
+                <a:ext uri="{FF2B5EF4-FFF2-40B4-BE49-F238E27FC236}">
+                  <a16:creationId xmlns:a16="http://schemas.microsoft.com/office/drawing/2014/main" id="{576C95FE-EFBA-4523-9A25-730ADBF10429}"/>
+                </a:ext>
+              </a:extLst>
+            </p:cNvPr>
+            <p:cNvSpPr txBox="1"/>
+            <p:nvPr/>
+          </p:nvSpPr>
+          <p:spPr>
+            <a:xfrm>
+              <a:off x="11601450" y="19150941"/>
+              <a:ext cx="1300544" cy="523220"/>
+            </a:xfrm>
+            <a:prstGeom prst="rect">
+              <a:avLst/>
+            </a:prstGeom>
+            <a:noFill/>
+          </p:spPr>
+          <p:txBody>
+            <a:bodyPr wrap="square" rtlCol="0">
+              <a:spAutoFit/>
+            </a:bodyPr>
+            <a:lstStyle/>
+            <a:p>
+              <a:pPr algn="r"/>
+              <a:r>
+                <a:rPr lang="en-US" sz="2800" dirty="0">
+                  <a:latin typeface="Arial" panose="020B0604020202020204" pitchFamily="34" charset="0"/>
+                  <a:cs typeface="Arial" panose="020B0604020202020204" pitchFamily="34" charset="0"/>
+                </a:rPr>
+                <a:t>0%</a:t>
+              </a:r>
+              <a:endParaRPr lang="en-AU" sz="2800" dirty="0">
+                <a:latin typeface="Arial" panose="020B0604020202020204" pitchFamily="34" charset="0"/>
+                <a:cs typeface="Arial" panose="020B0604020202020204" pitchFamily="34" charset="0"/>
+              </a:endParaRPr>
+            </a:p>
+          </p:txBody>
+        </p:sp>
+        <p:sp>
+          <p:nvSpPr>
+            <p:cNvPr id="54" name="TextBox 53">
+              <a:extLst>
+                <a:ext uri="{FF2B5EF4-FFF2-40B4-BE49-F238E27FC236}">
+                  <a16:creationId xmlns:a16="http://schemas.microsoft.com/office/drawing/2014/main" id="{E03E3763-A00C-49B1-B6B1-536F37228209}"/>
+                </a:ext>
+              </a:extLst>
+            </p:cNvPr>
+            <p:cNvSpPr txBox="1"/>
+            <p:nvPr/>
+          </p:nvSpPr>
+          <p:spPr>
+            <a:xfrm>
+              <a:off x="19642019" y="13997270"/>
+              <a:ext cx="1300544" cy="523220"/>
+            </a:xfrm>
+            <a:prstGeom prst="rect">
+              <a:avLst/>
+            </a:prstGeom>
+            <a:noFill/>
+          </p:spPr>
+          <p:txBody>
+            <a:bodyPr wrap="square" rtlCol="0">
+              <a:spAutoFit/>
+            </a:bodyPr>
+            <a:lstStyle/>
+            <a:p>
+              <a:pPr algn="r"/>
+              <a:r>
+                <a:rPr lang="en-US" sz="2800" dirty="0">
+                  <a:latin typeface="Arial" panose="020B0604020202020204" pitchFamily="34" charset="0"/>
+                  <a:cs typeface="Arial" panose="020B0604020202020204" pitchFamily="34" charset="0"/>
+                </a:rPr>
+                <a:t>0.016s</a:t>
+              </a:r>
+              <a:endParaRPr lang="en-AU" sz="2800" dirty="0">
+                <a:latin typeface="Arial" panose="020B0604020202020204" pitchFamily="34" charset="0"/>
+                <a:cs typeface="Arial" panose="020B0604020202020204" pitchFamily="34" charset="0"/>
+              </a:endParaRPr>
+            </a:p>
+          </p:txBody>
+        </p:sp>
+        <p:sp>
+          <p:nvSpPr>
+            <p:cNvPr id="55" name="TextBox 54">
+              <a:extLst>
+                <a:ext uri="{FF2B5EF4-FFF2-40B4-BE49-F238E27FC236}">
+                  <a16:creationId xmlns:a16="http://schemas.microsoft.com/office/drawing/2014/main" id="{A7B3D9FF-2D4F-43EF-8696-728AA2BC1188}"/>
+                </a:ext>
+              </a:extLst>
+            </p:cNvPr>
+            <p:cNvSpPr txBox="1"/>
+            <p:nvPr/>
+          </p:nvSpPr>
+          <p:spPr>
+            <a:xfrm>
+              <a:off x="19703604" y="15285369"/>
+              <a:ext cx="1300544" cy="523220"/>
+            </a:xfrm>
+            <a:prstGeom prst="rect">
+              <a:avLst/>
+            </a:prstGeom>
+            <a:noFill/>
+          </p:spPr>
+          <p:txBody>
+            <a:bodyPr wrap="square" rtlCol="0">
+              <a:spAutoFit/>
+            </a:bodyPr>
+            <a:lstStyle/>
+            <a:p>
+              <a:pPr algn="r"/>
+              <a:r>
+                <a:rPr lang="en-US" sz="2800" dirty="0">
+                  <a:latin typeface="Arial" panose="020B0604020202020204" pitchFamily="34" charset="0"/>
+                  <a:cs typeface="Arial" panose="020B0604020202020204" pitchFamily="34" charset="0"/>
+                </a:rPr>
+                <a:t>0.012s</a:t>
+              </a:r>
+              <a:endParaRPr lang="en-AU" sz="2800" dirty="0">
+                <a:latin typeface="Arial" panose="020B0604020202020204" pitchFamily="34" charset="0"/>
+                <a:cs typeface="Arial" panose="020B0604020202020204" pitchFamily="34" charset="0"/>
+              </a:endParaRPr>
+            </a:p>
+          </p:txBody>
+        </p:sp>
+        <p:sp>
+          <p:nvSpPr>
+            <p:cNvPr id="56" name="TextBox 55">
+              <a:extLst>
+                <a:ext uri="{FF2B5EF4-FFF2-40B4-BE49-F238E27FC236}">
+                  <a16:creationId xmlns:a16="http://schemas.microsoft.com/office/drawing/2014/main" id="{98B7A0FA-C09C-4801-9355-54A1732710F4}"/>
+                </a:ext>
+              </a:extLst>
+            </p:cNvPr>
+            <p:cNvSpPr txBox="1"/>
+            <p:nvPr/>
+          </p:nvSpPr>
+          <p:spPr>
+            <a:xfrm>
+              <a:off x="19703604" y="16584646"/>
+              <a:ext cx="1300544" cy="523220"/>
+            </a:xfrm>
+            <a:prstGeom prst="rect">
+              <a:avLst/>
+            </a:prstGeom>
+            <a:noFill/>
+          </p:spPr>
+          <p:txBody>
+            <a:bodyPr wrap="square" rtlCol="0">
+              <a:spAutoFit/>
+            </a:bodyPr>
+            <a:lstStyle/>
+            <a:p>
+              <a:pPr algn="r"/>
+              <a:r>
+                <a:rPr lang="en-US" sz="2800" dirty="0">
+                  <a:latin typeface="Arial" panose="020B0604020202020204" pitchFamily="34" charset="0"/>
+                  <a:cs typeface="Arial" panose="020B0604020202020204" pitchFamily="34" charset="0"/>
+                </a:rPr>
+                <a:t>0.008s</a:t>
+              </a:r>
+              <a:endParaRPr lang="en-AU" sz="2800" dirty="0">
+                <a:latin typeface="Arial" panose="020B0604020202020204" pitchFamily="34" charset="0"/>
+                <a:cs typeface="Arial" panose="020B0604020202020204" pitchFamily="34" charset="0"/>
+              </a:endParaRPr>
+            </a:p>
+          </p:txBody>
+        </p:sp>
+        <p:sp>
+          <p:nvSpPr>
+            <p:cNvPr id="57" name="TextBox 56">
+              <a:extLst>
+                <a:ext uri="{FF2B5EF4-FFF2-40B4-BE49-F238E27FC236}">
+                  <a16:creationId xmlns:a16="http://schemas.microsoft.com/office/drawing/2014/main" id="{BB8AFE21-318D-4812-9355-952D8816344C}"/>
+                </a:ext>
+              </a:extLst>
+            </p:cNvPr>
+            <p:cNvSpPr txBox="1"/>
+            <p:nvPr/>
+          </p:nvSpPr>
+          <p:spPr>
+            <a:xfrm>
+              <a:off x="19703604" y="17916126"/>
+              <a:ext cx="1300544" cy="523220"/>
+            </a:xfrm>
+            <a:prstGeom prst="rect">
+              <a:avLst/>
+            </a:prstGeom>
+            <a:noFill/>
+          </p:spPr>
+          <p:txBody>
+            <a:bodyPr wrap="square" rtlCol="0">
+              <a:spAutoFit/>
+            </a:bodyPr>
+            <a:lstStyle/>
+            <a:p>
+              <a:pPr algn="r"/>
+              <a:r>
+                <a:rPr lang="en-US" sz="2800" dirty="0">
+                  <a:latin typeface="Arial" panose="020B0604020202020204" pitchFamily="34" charset="0"/>
+                  <a:cs typeface="Arial" panose="020B0604020202020204" pitchFamily="34" charset="0"/>
+                </a:rPr>
+                <a:t>0.004s</a:t>
+              </a:r>
+              <a:endParaRPr lang="en-AU" sz="2800" dirty="0">
+                <a:latin typeface="Arial" panose="020B0604020202020204" pitchFamily="34" charset="0"/>
+                <a:cs typeface="Arial" panose="020B0604020202020204" pitchFamily="34" charset="0"/>
+              </a:endParaRPr>
+            </a:p>
+          </p:txBody>
+        </p:sp>
+        <p:sp>
+          <p:nvSpPr>
+            <p:cNvPr id="58" name="TextBox 57">
+              <a:extLst>
+                <a:ext uri="{FF2B5EF4-FFF2-40B4-BE49-F238E27FC236}">
+                  <a16:creationId xmlns:a16="http://schemas.microsoft.com/office/drawing/2014/main" id="{3E655D7E-6831-4EED-8A39-798A2C062D2D}"/>
+                </a:ext>
+              </a:extLst>
+            </p:cNvPr>
+            <p:cNvSpPr txBox="1"/>
+            <p:nvPr/>
+          </p:nvSpPr>
+          <p:spPr>
+            <a:xfrm>
+              <a:off x="19703604" y="19150941"/>
+              <a:ext cx="1300544" cy="523220"/>
+            </a:xfrm>
+            <a:prstGeom prst="rect">
+              <a:avLst/>
+            </a:prstGeom>
+            <a:noFill/>
+          </p:spPr>
+          <p:txBody>
+            <a:bodyPr wrap="square" rtlCol="0">
+              <a:spAutoFit/>
+            </a:bodyPr>
+            <a:lstStyle/>
+            <a:p>
+              <a:pPr algn="r"/>
+              <a:r>
+                <a:rPr lang="en-US" sz="2800" dirty="0">
+                  <a:latin typeface="Arial" panose="020B0604020202020204" pitchFamily="34" charset="0"/>
+                  <a:cs typeface="Arial" panose="020B0604020202020204" pitchFamily="34" charset="0"/>
+                </a:rPr>
+                <a:t>0.000s</a:t>
+              </a:r>
+              <a:endParaRPr lang="en-AU" sz="2800" dirty="0">
                 <a:latin typeface="Arial" panose="020B0604020202020204" pitchFamily="34" charset="0"/>
                 <a:cs typeface="Arial" panose="020B0604020202020204" pitchFamily="34" charset="0"/>
               </a:endParaRPr>

</xml_diff>